<commit_message>
edits based on Lisa's comments
</commit_message>
<xml_diff>
--- a/experimental/ietf/ietf90 acl draft.pptx
+++ b/experimental/ietf/ietf90 acl draft.pptx
@@ -8,7 +8,7 @@
     <p:sldId id="256" r:id="rId2"/>
     <p:sldId id="257" r:id="rId3"/>
     <p:sldId id="259" r:id="rId4"/>
-    <p:sldId id="258" r:id="rId5"/>
+    <p:sldId id="261" r:id="rId5"/>
     <p:sldId id="260" r:id="rId6"/>
   </p:sldIdLst>
   <p:sldSz cx="9144000" cy="6858000" type="screen4x3"/>
@@ -3123,7 +3123,7 @@
           <a:p>
             <a:r>
               <a:rPr lang="en-US" dirty="0" smtClean="0"/>
-              <a:t>Access Control List YANG Model</a:t>
+              <a:t>Access Control List Model</a:t>
             </a:r>
             <a:br>
               <a:rPr lang="en-US" dirty="0" smtClean="0"/>
@@ -3272,7 +3272,7 @@
             </a:r>
             <a:r>
               <a:rPr lang="en-US" dirty="0" smtClean="0"/>
-              <a:t> was company specific</a:t>
+              <a:t> was complicated and the ACL structure is not obvious</a:t>
             </a:r>
           </a:p>
           <a:p>
@@ -3363,27 +3363,40 @@
             <p:ph idx="1"/>
           </p:nvPr>
         </p:nvSpPr>
-        <p:spPr/>
+        <p:spPr>
+          <a:xfrm>
+            <a:off x="457200" y="1600200"/>
+            <a:ext cx="8229600" cy="5047483"/>
+          </a:xfrm>
+        </p:spPr>
         <p:txBody>
           <a:bodyPr>
-            <a:normAutofit fontScale="92500" lnSpcReduction="20000"/>
+            <a:normAutofit fontScale="92500" lnSpcReduction="10000"/>
           </a:bodyPr>
           <a:lstStyle/>
           <a:p>
             <a:r>
-              <a:rPr lang="en-US" dirty="0" smtClean="0"/>
-              <a:t>Base model</a:t>
-            </a:r>
+              <a:rPr lang="en-US" dirty="0" err="1" smtClean="0"/>
+              <a:t>ietf-acl</a:t>
+            </a:r>
+            <a:endParaRPr lang="en-US" dirty="0"/>
           </a:p>
           <a:p>
             <a:pPr lvl="1"/>
             <a:r>
               <a:rPr lang="en-US" dirty="0" smtClean="0"/>
+              <a:t>base model</a:t>
+            </a:r>
+          </a:p>
+          <a:p>
+            <a:pPr lvl="2"/>
+            <a:r>
+              <a:rPr lang="en-US" dirty="0" smtClean="0"/>
               <a:t>ACL container</a:t>
             </a:r>
           </a:p>
           <a:p>
-            <a:pPr lvl="2"/>
+            <a:pPr lvl="3"/>
             <a:r>
               <a:rPr lang="en-US" dirty="0" smtClean="0"/>
               <a:t>ACL </a:t>
@@ -3398,21 +3411,21 @@
             </a:r>
           </a:p>
           <a:p>
-            <a:pPr lvl="2"/>
+            <a:pPr lvl="3"/>
             <a:r>
               <a:rPr lang="en-US" dirty="0" smtClean="0"/>
               <a:t>ACE List</a:t>
             </a:r>
           </a:p>
           <a:p>
-            <a:pPr lvl="3"/>
+            <a:pPr lvl="4"/>
             <a:r>
               <a:rPr lang="en-US" dirty="0" smtClean="0"/>
               <a:t>Match container</a:t>
             </a:r>
           </a:p>
           <a:p>
-            <a:pPr lvl="3"/>
+            <a:pPr lvl="4"/>
             <a:r>
               <a:rPr lang="en-US" dirty="0" smtClean="0"/>
               <a:t>Action container</a:t>
@@ -3502,24 +3515,28 @@
       </p:grpSpPr>
       <p:sp>
         <p:nvSpPr>
-          <p:cNvPr id="16" name="Process 15"/>
+          <p:cNvPr id="5" name="Rounded Rectangle 4"/>
           <p:cNvSpPr/>
           <p:nvPr/>
         </p:nvSpPr>
         <p:spPr>
           <a:xfrm>
-            <a:off x="1748846" y="1896482"/>
-            <a:ext cx="2292242" cy="3563525"/>
+            <a:off x="1920449" y="1534084"/>
+            <a:ext cx="3440182" cy="4998133"/>
           </a:xfrm>
-          <a:prstGeom prst="flowChartProcess">
+          <a:prstGeom prst="roundRect">
             <a:avLst/>
           </a:prstGeom>
           <a:solidFill>
-            <a:srgbClr val="FFFFFF"/>
+            <a:schemeClr val="bg1">
+              <a:lumMod val="75000"/>
+            </a:schemeClr>
           </a:solidFill>
           <a:ln>
             <a:solidFill>
-              <a:srgbClr val="000000"/>
+              <a:schemeClr val="bg1">
+                <a:lumMod val="85000"/>
+              </a:schemeClr>
             </a:solidFill>
           </a:ln>
         </p:spPr>
@@ -3541,51 +3558,58 @@
           <a:bodyPr rtlCol="0" anchor="ctr"/>
           <a:lstStyle/>
           <a:p>
+            <a:pPr algn="ctr"/>
+            <a:endParaRPr lang="en-US"/>
+          </a:p>
+        </p:txBody>
+      </p:sp>
+      <p:sp>
+        <p:nvSpPr>
+          <p:cNvPr id="2" name="Title 1"/>
+          <p:cNvSpPr>
+            <a:spLocks noGrp="1"/>
+          </p:cNvSpPr>
+          <p:nvPr>
+            <p:ph type="title"/>
+          </p:nvPr>
+        </p:nvSpPr>
+        <p:spPr/>
+        <p:txBody>
+          <a:bodyPr/>
+          <a:lstStyle/>
+          <a:p>
+            <a:r>
+              <a:rPr lang="en-US" dirty="0" smtClean="0"/>
+              <a:t>Design cont’d</a:t>
+            </a:r>
             <a:endParaRPr lang="en-US" dirty="0"/>
           </a:p>
         </p:txBody>
       </p:sp>
       <p:sp>
         <p:nvSpPr>
-          <p:cNvPr id="2" name="Title 1"/>
-          <p:cNvSpPr>
-            <a:spLocks noGrp="1"/>
-          </p:cNvSpPr>
-          <p:nvPr>
-            <p:ph type="title"/>
-          </p:nvPr>
-        </p:nvSpPr>
-        <p:spPr/>
-        <p:txBody>
-          <a:bodyPr/>
-          <a:lstStyle/>
-          <a:p>
-            <a:r>
-              <a:rPr lang="en-US" dirty="0" smtClean="0"/>
-              <a:t>Design cont’d</a:t>
-            </a:r>
-            <a:endParaRPr lang="en-US" dirty="0"/>
-          </a:p>
-        </p:txBody>
-      </p:sp>
-      <p:sp>
-        <p:nvSpPr>
-          <p:cNvPr id="5" name="Document 4"/>
+          <p:cNvPr id="6" name="Rounded Rectangle 5"/>
           <p:cNvSpPr/>
           <p:nvPr/>
         </p:nvSpPr>
         <p:spPr>
           <a:xfrm>
-            <a:off x="1428388" y="1286143"/>
-            <a:ext cx="3222988" cy="5411026"/>
+            <a:off x="2441149" y="2556801"/>
+            <a:ext cx="2516509" cy="758793"/>
           </a:xfrm>
-          <a:prstGeom prst="flowChartDocument">
+          <a:prstGeom prst="roundRect">
             <a:avLst/>
           </a:prstGeom>
-          <a:noFill/>
+          <a:solidFill>
+            <a:schemeClr val="bg1">
+              <a:lumMod val="85000"/>
+            </a:schemeClr>
+          </a:solidFill>
           <a:ln>
             <a:solidFill>
-              <a:schemeClr val="tx1"/>
+              <a:schemeClr val="bg1">
+                <a:lumMod val="85000"/>
+              </a:schemeClr>
             </a:solidFill>
           </a:ln>
         </p:spPr>
@@ -3614,56 +3638,28 @@
       </p:sp>
       <p:sp>
         <p:nvSpPr>
-          <p:cNvPr id="6" name="TextBox 5"/>
-          <p:cNvSpPr txBox="1"/>
+          <p:cNvPr id="7" name="Rounded Rectangle 6"/>
+          <p:cNvSpPr/>
           <p:nvPr/>
         </p:nvSpPr>
         <p:spPr>
           <a:xfrm>
-            <a:off x="1428388" y="1266632"/>
-            <a:ext cx="881262" cy="369332"/>
+            <a:off x="2441149" y="3847390"/>
+            <a:ext cx="2516509" cy="936302"/>
           </a:xfrm>
-          <a:prstGeom prst="rect">
+          <a:prstGeom prst="roundRect">
             <a:avLst/>
           </a:prstGeom>
-          <a:noFill/>
-        </p:spPr>
-        <p:txBody>
-          <a:bodyPr wrap="square" rtlCol="0">
-            <a:spAutoFit/>
-          </a:bodyPr>
-          <a:lstStyle/>
-          <a:p>
-            <a:r>
-              <a:rPr lang="en-US" dirty="0" err="1"/>
-              <a:t>i</a:t>
-            </a:r>
-            <a:r>
-              <a:rPr lang="en-US" dirty="0" err="1" smtClean="0"/>
-              <a:t>etf-acl</a:t>
-            </a:r>
-            <a:endParaRPr lang="en-US" dirty="0"/>
-          </a:p>
-        </p:txBody>
-      </p:sp>
-      <p:sp>
-        <p:nvSpPr>
-          <p:cNvPr id="7" name="Document 6"/>
-          <p:cNvSpPr/>
-          <p:nvPr/>
-        </p:nvSpPr>
-        <p:spPr>
-          <a:xfrm>
-            <a:off x="162111" y="3367417"/>
-            <a:ext cx="1091450" cy="1268542"/>
-          </a:xfrm>
-          <a:prstGeom prst="flowChartDocument">
-            <a:avLst/>
-          </a:prstGeom>
-          <a:noFill/>
+          <a:solidFill>
+            <a:schemeClr val="bg1">
+              <a:lumMod val="85000"/>
+            </a:schemeClr>
+          </a:solidFill>
           <a:ln>
             <a:solidFill>
-              <a:schemeClr val="tx1"/>
+              <a:schemeClr val="bg1">
+                <a:lumMod val="85000"/>
+              </a:schemeClr>
             </a:solidFill>
           </a:ln>
         </p:spPr>
@@ -3692,92 +3688,28 @@
       </p:sp>
       <p:sp>
         <p:nvSpPr>
-          <p:cNvPr id="8" name="TextBox 7"/>
-          <p:cNvSpPr txBox="1"/>
+          <p:cNvPr id="8" name="Rounded Rectangle 7"/>
+          <p:cNvSpPr/>
           <p:nvPr/>
         </p:nvSpPr>
         <p:spPr>
           <a:xfrm>
-            <a:off x="162111" y="3667445"/>
-            <a:ext cx="1036354" cy="646331"/>
+            <a:off x="2441149" y="5002074"/>
+            <a:ext cx="2516509" cy="804339"/>
           </a:xfrm>
-          <a:prstGeom prst="rect">
-            <a:avLst/>
-          </a:prstGeom>
-          <a:noFill/>
-        </p:spPr>
-        <p:txBody>
-          <a:bodyPr wrap="square" rtlCol="0">
-            <a:spAutoFit/>
-          </a:bodyPr>
-          <a:lstStyle/>
-          <a:p>
-            <a:pPr algn="ctr"/>
-            <a:r>
-              <a:rPr lang="en-US" dirty="0" smtClean="0"/>
-              <a:t>packet</a:t>
-            </a:r>
-          </a:p>
-          <a:p>
-            <a:pPr algn="ctr"/>
-            <a:r>
-              <a:rPr lang="en-US" dirty="0" smtClean="0"/>
-              <a:t>fields</a:t>
-            </a:r>
-            <a:endParaRPr lang="en-US" dirty="0"/>
-          </a:p>
-        </p:txBody>
-      </p:sp>
-      <p:sp>
-        <p:nvSpPr>
-          <p:cNvPr id="17" name="TextBox 16"/>
-          <p:cNvSpPr txBox="1"/>
-          <p:nvPr/>
-        </p:nvSpPr>
-        <p:spPr>
-          <a:xfrm>
-            <a:off x="1748846" y="1897394"/>
-            <a:ext cx="676264" cy="369332"/>
-          </a:xfrm>
-          <a:prstGeom prst="rect">
-            <a:avLst/>
-          </a:prstGeom>
-          <a:noFill/>
-        </p:spPr>
-        <p:txBody>
-          <a:bodyPr wrap="square" rtlCol="0">
-            <a:spAutoFit/>
-          </a:bodyPr>
-          <a:lstStyle/>
-          <a:p>
-            <a:r>
-              <a:rPr lang="en-US" dirty="0" err="1" smtClean="0"/>
-              <a:t>acl</a:t>
-            </a:r>
-            <a:endParaRPr lang="en-US" dirty="0"/>
-          </a:p>
-        </p:txBody>
-      </p:sp>
-      <p:sp>
-        <p:nvSpPr>
-          <p:cNvPr id="18" name="Process 17"/>
-          <p:cNvSpPr/>
-          <p:nvPr/>
-        </p:nvSpPr>
-        <p:spPr>
-          <a:xfrm>
-            <a:off x="1901246" y="3006502"/>
-            <a:ext cx="1941911" cy="2255559"/>
-          </a:xfrm>
-          <a:prstGeom prst="flowChartProcess">
+          <a:prstGeom prst="roundRect">
             <a:avLst/>
           </a:prstGeom>
           <a:solidFill>
-            <a:srgbClr val="FFFFFF"/>
+            <a:schemeClr val="bg1">
+              <a:lumMod val="85000"/>
+            </a:schemeClr>
           </a:solidFill>
           <a:ln>
             <a:solidFill>
-              <a:srgbClr val="000000"/>
+              <a:schemeClr val="bg1">
+                <a:lumMod val="85000"/>
+              </a:schemeClr>
             </a:solidFill>
           </a:ln>
         </p:spPr>
@@ -3799,20 +3731,21 @@
           <a:bodyPr rtlCol="0" anchor="ctr"/>
           <a:lstStyle/>
           <a:p>
-            <a:endParaRPr lang="en-US" dirty="0"/>
-          </a:p>
-        </p:txBody>
-      </p:sp>
-      <p:sp>
-        <p:nvSpPr>
-          <p:cNvPr id="19" name="TextBox 18"/>
+            <a:pPr algn="ctr"/>
+            <a:endParaRPr lang="en-US"/>
+          </a:p>
+        </p:txBody>
+      </p:sp>
+      <p:sp>
+        <p:nvSpPr>
+          <p:cNvPr id="4" name="TextBox 3"/>
           <p:cNvSpPr txBox="1"/>
           <p:nvPr/>
         </p:nvSpPr>
         <p:spPr>
           <a:xfrm>
-            <a:off x="1901703" y="3006502"/>
-            <a:ext cx="676264" cy="369332"/>
+            <a:off x="2233835" y="1633054"/>
+            <a:ext cx="2723823" cy="4801315"/>
           </a:xfrm>
           <a:prstGeom prst="rect">
             <a:avLst/>
@@ -3820,14 +3753,211 @@
           <a:noFill/>
         </p:spPr>
         <p:txBody>
-          <a:bodyPr wrap="square" rtlCol="0">
+          <a:bodyPr wrap="none" rtlCol="0">
             <a:spAutoFit/>
           </a:bodyPr>
           <a:lstStyle/>
           <a:p>
             <a:r>
               <a:rPr lang="en-US" dirty="0" smtClean="0"/>
-              <a:t>ace</a:t>
+              <a:t>module: </a:t>
+            </a:r>
+            <a:r>
+              <a:rPr lang="en-US" dirty="0" err="1" smtClean="0"/>
+              <a:t>ietf-acl</a:t>
+            </a:r>
+            <a:endParaRPr lang="en-US" dirty="0" smtClean="0"/>
+          </a:p>
+          <a:p>
+            <a:r>
+              <a:rPr lang="en-US" dirty="0" smtClean="0"/>
+              <a:t>   +--</a:t>
+            </a:r>
+            <a:r>
+              <a:rPr lang="en-US" dirty="0" err="1" smtClean="0"/>
+              <a:t>rw</a:t>
+            </a:r>
+            <a:r>
+              <a:rPr lang="en-US" dirty="0" smtClean="0"/>
+              <a:t> access-list</a:t>
+            </a:r>
+          </a:p>
+          <a:p>
+            <a:r>
+              <a:rPr lang="en-US" dirty="0" smtClean="0"/>
+              <a:t>      +--</a:t>
+            </a:r>
+            <a:r>
+              <a:rPr lang="en-US" dirty="0" err="1" smtClean="0"/>
+              <a:t>rw</a:t>
+            </a:r>
+            <a:r>
+              <a:rPr lang="en-US" dirty="0" smtClean="0"/>
+              <a:t> </a:t>
+            </a:r>
+            <a:r>
+              <a:rPr lang="en-US" dirty="0" err="1" smtClean="0"/>
+              <a:t>acl</a:t>
+            </a:r>
+            <a:r>
+              <a:rPr lang="en-US" dirty="0" smtClean="0"/>
+              <a:t>-name</a:t>
+            </a:r>
+          </a:p>
+          <a:p>
+            <a:r>
+              <a:rPr lang="en-US" dirty="0" smtClean="0"/>
+              <a:t>      +--</a:t>
+            </a:r>
+            <a:r>
+              <a:rPr lang="en-US" dirty="0" err="1" smtClean="0"/>
+              <a:t>rw</a:t>
+            </a:r>
+            <a:r>
+              <a:rPr lang="en-US" dirty="0" smtClean="0"/>
+              <a:t> </a:t>
+            </a:r>
+            <a:r>
+              <a:rPr lang="en-US" dirty="0" err="1" smtClean="0"/>
+              <a:t>acl</a:t>
+            </a:r>
+            <a:r>
+              <a:rPr lang="en-US" dirty="0" smtClean="0"/>
+              <a:t>-</a:t>
+            </a:r>
+            <a:r>
+              <a:rPr lang="en-US" dirty="0" err="1" smtClean="0"/>
+              <a:t>oper</a:t>
+            </a:r>
+            <a:r>
+              <a:rPr lang="en-US" dirty="0" smtClean="0"/>
+              <a:t>-data</a:t>
+            </a:r>
+          </a:p>
+          <a:p>
+            <a:r>
+              <a:rPr lang="en-US" dirty="0" smtClean="0"/>
+              <a:t>      |  ...</a:t>
+            </a:r>
+          </a:p>
+          <a:p>
+            <a:r>
+              <a:rPr lang="en-US" dirty="0" smtClean="0"/>
+              <a:t>      |  ...</a:t>
+            </a:r>
+          </a:p>
+          <a:p>
+            <a:r>
+              <a:rPr lang="en-US" dirty="0" smtClean="0"/>
+              <a:t>      +--</a:t>
+            </a:r>
+            <a:r>
+              <a:rPr lang="en-US" dirty="0" err="1" smtClean="0"/>
+              <a:t>rw</a:t>
+            </a:r>
+            <a:r>
+              <a:rPr lang="en-US" dirty="0" smtClean="0"/>
+              <a:t> access-list-entries</a:t>
+            </a:r>
+          </a:p>
+          <a:p>
+            <a:r>
+              <a:rPr lang="en-US" dirty="0" smtClean="0"/>
+              <a:t>      |</a:t>
+            </a:r>
+          </a:p>
+          <a:p>
+            <a:r>
+              <a:rPr lang="en-US" dirty="0" smtClean="0"/>
+              <a:t>      |  +--</a:t>
+            </a:r>
+            <a:r>
+              <a:rPr lang="en-US" dirty="0" err="1" smtClean="0"/>
+              <a:t>rw</a:t>
+            </a:r>
+            <a:r>
+              <a:rPr lang="en-US" dirty="0" smtClean="0"/>
+              <a:t> matches</a:t>
+            </a:r>
+          </a:p>
+          <a:p>
+            <a:r>
+              <a:rPr lang="en-US" dirty="0" smtClean="0"/>
+              <a:t>      |  |  +--</a:t>
+            </a:r>
+            <a:r>
+              <a:rPr lang="en-US" dirty="0" err="1" smtClean="0"/>
+              <a:t>rw</a:t>
+            </a:r>
+            <a:r>
+              <a:rPr lang="en-US" dirty="0" smtClean="0"/>
+              <a:t> (ace-type)</a:t>
+            </a:r>
+          </a:p>
+          <a:p>
+            <a:r>
+              <a:rPr lang="en-US" dirty="0" smtClean="0"/>
+              <a:t>      |  |  ...</a:t>
+            </a:r>
+          </a:p>
+          <a:p>
+            <a:r>
+              <a:rPr lang="en-US" dirty="0" smtClean="0"/>
+              <a:t>      |  |  ...</a:t>
+            </a:r>
+          </a:p>
+          <a:p>
+            <a:r>
+              <a:rPr lang="en-US" dirty="0" smtClean="0"/>
+              <a:t>      |  +--</a:t>
+            </a:r>
+            <a:r>
+              <a:rPr lang="en-US" dirty="0" err="1" smtClean="0"/>
+              <a:t>rw</a:t>
+            </a:r>
+            <a:r>
+              <a:rPr lang="en-US" dirty="0" smtClean="0"/>
+              <a:t> actions</a:t>
+            </a:r>
+          </a:p>
+          <a:p>
+            <a:r>
+              <a:rPr lang="en-US" dirty="0" smtClean="0"/>
+              <a:t>      |  |  ...</a:t>
+            </a:r>
+          </a:p>
+          <a:p>
+            <a:r>
+              <a:rPr lang="en-US" dirty="0" smtClean="0"/>
+              <a:t>      |	 |  ...</a:t>
+            </a:r>
+          </a:p>
+          <a:p>
+            <a:r>
+              <a:rPr lang="en-US" dirty="0" smtClean="0"/>
+              <a:t>      +--</a:t>
+            </a:r>
+            <a:r>
+              <a:rPr lang="en-US" dirty="0" err="1" smtClean="0"/>
+              <a:t>rw</a:t>
+            </a:r>
+            <a:r>
+              <a:rPr lang="en-US" dirty="0" smtClean="0"/>
+              <a:t> default-actions</a:t>
+            </a:r>
+          </a:p>
+          <a:p>
+            <a:r>
+              <a:rPr lang="en-US" dirty="0" smtClean="0"/>
+              <a:t>         +--</a:t>
+            </a:r>
+            <a:r>
+              <a:rPr lang="en-US" dirty="0" err="1" smtClean="0"/>
+              <a:t>rw</a:t>
+            </a:r>
+            <a:r>
+              <a:rPr lang="en-US" dirty="0" smtClean="0"/>
+              <a:t> deny?   empty</a:t>
             </a:r>
             <a:endParaRPr lang="en-US" dirty="0"/>
           </a:p>
@@ -3835,59 +3965,14 @@
       </p:sp>
       <p:sp>
         <p:nvSpPr>
-          <p:cNvPr id="20" name="Process 19"/>
-          <p:cNvSpPr/>
+          <p:cNvPr id="9" name="TextBox 8"/>
+          <p:cNvSpPr txBox="1"/>
           <p:nvPr/>
         </p:nvSpPr>
         <p:spPr>
           <a:xfrm>
-            <a:off x="1901246" y="2266726"/>
-            <a:ext cx="1941911" cy="548291"/>
-          </a:xfrm>
-          <a:prstGeom prst="flowChartProcess">
-            <a:avLst/>
-          </a:prstGeom>
-          <a:solidFill>
-            <a:srgbClr val="FFFFFF"/>
-          </a:solidFill>
-          <a:ln>
-            <a:solidFill>
-              <a:srgbClr val="000000"/>
-            </a:solidFill>
-          </a:ln>
-        </p:spPr>
-        <p:style>
-          <a:lnRef idx="1">
-            <a:schemeClr val="accent1"/>
-          </a:lnRef>
-          <a:fillRef idx="3">
-            <a:schemeClr val="accent1"/>
-          </a:fillRef>
-          <a:effectRef idx="2">
-            <a:schemeClr val="accent1"/>
-          </a:effectRef>
-          <a:fontRef idx="minor">
-            <a:schemeClr val="lt1"/>
-          </a:fontRef>
-        </p:style>
-        <p:txBody>
-          <a:bodyPr rtlCol="0" anchor="ctr"/>
-          <a:lstStyle/>
-          <a:p>
-            <a:endParaRPr lang="en-US" dirty="0"/>
-          </a:p>
-        </p:txBody>
-      </p:sp>
-      <p:sp>
-        <p:nvSpPr>
-          <p:cNvPr id="21" name="TextBox 20"/>
-          <p:cNvSpPr txBox="1"/>
-          <p:nvPr/>
-        </p:nvSpPr>
-        <p:spPr>
-          <a:xfrm>
-            <a:off x="1901703" y="2287575"/>
-            <a:ext cx="1941453" cy="369332"/>
+            <a:off x="6614194" y="2622784"/>
+            <a:ext cx="1672253" cy="523220"/>
           </a:xfrm>
           <a:prstGeom prst="rect">
             <a:avLst/>
@@ -3895,135 +3980,39 @@
           <a:noFill/>
         </p:spPr>
         <p:txBody>
-          <a:bodyPr wrap="square" rtlCol="0">
+          <a:bodyPr wrap="none" rtlCol="0">
             <a:spAutoFit/>
           </a:bodyPr>
           <a:lstStyle/>
           <a:p>
             <a:r>
-              <a:rPr lang="en-US" dirty="0" err="1"/>
-              <a:t>a</a:t>
-            </a:r>
-            <a:r>
-              <a:rPr lang="en-US" dirty="0" err="1" smtClean="0"/>
-              <a:t>cl</a:t>
-            </a:r>
-            <a:r>
-              <a:rPr lang="en-US" dirty="0" smtClean="0"/>
-              <a:t>-</a:t>
-            </a:r>
-            <a:r>
-              <a:rPr lang="en-US" dirty="0" err="1" smtClean="0"/>
-              <a:t>oper</a:t>
-            </a:r>
-            <a:r>
-              <a:rPr lang="en-US" dirty="0" smtClean="0"/>
-              <a:t>-data</a:t>
-            </a:r>
-            <a:endParaRPr lang="en-US" dirty="0"/>
-          </a:p>
-        </p:txBody>
-      </p:sp>
-      <p:sp>
-        <p:nvSpPr>
-          <p:cNvPr id="22" name="Process 21"/>
-          <p:cNvSpPr/>
+              <a:rPr lang="en-US" sz="1400" dirty="0" smtClean="0"/>
+              <a:t>Operation data: </a:t>
+            </a:r>
+          </a:p>
+          <a:p>
+            <a:r>
+              <a:rPr lang="en-US" sz="1400" dirty="0" smtClean="0"/>
+              <a:t>counter, targets, </a:t>
+            </a:r>
+            <a:r>
+              <a:rPr lang="en-US" sz="1400" dirty="0" err="1" smtClean="0"/>
+              <a:t>etc</a:t>
+            </a:r>
+            <a:endParaRPr lang="en-US" sz="1400" dirty="0"/>
+          </a:p>
+        </p:txBody>
+      </p:sp>
+      <p:sp>
+        <p:nvSpPr>
+          <p:cNvPr id="10" name="TextBox 9"/>
+          <p:cNvSpPr txBox="1"/>
           <p:nvPr/>
         </p:nvSpPr>
         <p:spPr>
           <a:xfrm>
-            <a:off x="2028789" y="3484864"/>
-            <a:ext cx="1662423" cy="704990"/>
-          </a:xfrm>
-          <a:prstGeom prst="flowChartProcess">
-            <a:avLst/>
-          </a:prstGeom>
-          <a:solidFill>
-            <a:srgbClr val="FFFFFF"/>
-          </a:solidFill>
-          <a:ln>
-            <a:solidFill>
-              <a:srgbClr val="000000"/>
-            </a:solidFill>
-          </a:ln>
-        </p:spPr>
-        <p:style>
-          <a:lnRef idx="1">
-            <a:schemeClr val="accent1"/>
-          </a:lnRef>
-          <a:fillRef idx="3">
-            <a:schemeClr val="accent1"/>
-          </a:fillRef>
-          <a:effectRef idx="2">
-            <a:schemeClr val="accent1"/>
-          </a:effectRef>
-          <a:fontRef idx="minor">
-            <a:schemeClr val="lt1"/>
-          </a:fontRef>
-        </p:style>
-        <p:txBody>
-          <a:bodyPr rtlCol="0" anchor="ctr"/>
-          <a:lstStyle/>
-          <a:p>
-            <a:endParaRPr lang="en-US" dirty="0"/>
-          </a:p>
-        </p:txBody>
-      </p:sp>
-      <p:sp>
-        <p:nvSpPr>
-          <p:cNvPr id="23" name="Process 22"/>
-          <p:cNvSpPr/>
-          <p:nvPr/>
-        </p:nvSpPr>
-        <p:spPr>
-          <a:xfrm>
-            <a:off x="2028789" y="4313776"/>
-            <a:ext cx="1662423" cy="799826"/>
-          </a:xfrm>
-          <a:prstGeom prst="flowChartProcess">
-            <a:avLst/>
-          </a:prstGeom>
-          <a:solidFill>
-            <a:srgbClr val="FFFFFF"/>
-          </a:solidFill>
-          <a:ln>
-            <a:solidFill>
-              <a:srgbClr val="000000"/>
-            </a:solidFill>
-          </a:ln>
-        </p:spPr>
-        <p:style>
-          <a:lnRef idx="1">
-            <a:schemeClr val="accent1"/>
-          </a:lnRef>
-          <a:fillRef idx="3">
-            <a:schemeClr val="accent1"/>
-          </a:fillRef>
-          <a:effectRef idx="2">
-            <a:schemeClr val="accent1"/>
-          </a:effectRef>
-          <a:fontRef idx="minor">
-            <a:schemeClr val="lt1"/>
-          </a:fontRef>
-        </p:style>
-        <p:txBody>
-          <a:bodyPr rtlCol="0" anchor="ctr"/>
-          <a:lstStyle/>
-          <a:p>
-            <a:endParaRPr lang="en-US" dirty="0"/>
-          </a:p>
-        </p:txBody>
-      </p:sp>
-      <p:sp>
-        <p:nvSpPr>
-          <p:cNvPr id="24" name="TextBox 23"/>
-          <p:cNvSpPr txBox="1"/>
-          <p:nvPr/>
-        </p:nvSpPr>
-        <p:spPr>
-          <a:xfrm>
-            <a:off x="2054103" y="3493127"/>
-            <a:ext cx="865376" cy="369332"/>
+            <a:off x="6614194" y="3906036"/>
+            <a:ext cx="1687932" cy="738664"/>
           </a:xfrm>
           <a:prstGeom prst="rect">
             <a:avLst/>
@@ -4031,29 +4020,49 @@
           <a:noFill/>
         </p:spPr>
         <p:txBody>
-          <a:bodyPr wrap="square" rtlCol="0">
+          <a:bodyPr wrap="none" rtlCol="0">
             <a:spAutoFit/>
           </a:bodyPr>
           <a:lstStyle/>
           <a:p>
             <a:r>
-              <a:rPr lang="en-US" dirty="0" smtClean="0"/>
-              <a:t>match</a:t>
-            </a:r>
-            <a:endParaRPr lang="en-US" dirty="0"/>
-          </a:p>
-        </p:txBody>
-      </p:sp>
-      <p:sp>
-        <p:nvSpPr>
-          <p:cNvPr id="25" name="TextBox 24"/>
+              <a:rPr lang="en-US" sz="1400" dirty="0" smtClean="0"/>
+              <a:t>Matches container:</a:t>
+            </a:r>
+          </a:p>
+          <a:p>
+            <a:r>
+              <a:rPr lang="en-US" sz="1400" dirty="0"/>
+              <a:t>p</a:t>
+            </a:r>
+            <a:r>
+              <a:rPr lang="en-US" sz="1400" dirty="0" smtClean="0"/>
+              <a:t>acket-header-fields</a:t>
+            </a:r>
+          </a:p>
+          <a:p>
+            <a:r>
+              <a:rPr lang="en-US" sz="1400" dirty="0"/>
+              <a:t>m</a:t>
+            </a:r>
+            <a:r>
+              <a:rPr lang="en-US" sz="1400" dirty="0" smtClean="0"/>
+              <a:t>eta data filters</a:t>
+            </a:r>
+            <a:endParaRPr lang="en-US" sz="1400" dirty="0"/>
+          </a:p>
+        </p:txBody>
+      </p:sp>
+      <p:sp>
+        <p:nvSpPr>
+          <p:cNvPr id="11" name="TextBox 10"/>
           <p:cNvSpPr txBox="1"/>
           <p:nvPr/>
         </p:nvSpPr>
         <p:spPr>
           <a:xfrm>
-            <a:off x="2066644" y="4313776"/>
-            <a:ext cx="1001284" cy="369332"/>
+            <a:off x="6614194" y="5152466"/>
+            <a:ext cx="1467068" cy="307777"/>
           </a:xfrm>
           <a:prstGeom prst="rect">
             <a:avLst/>
@@ -4061,137 +4070,32 @@
           <a:noFill/>
         </p:spPr>
         <p:txBody>
-          <a:bodyPr wrap="square" rtlCol="0">
+          <a:bodyPr wrap="none" rtlCol="0">
             <a:spAutoFit/>
           </a:bodyPr>
           <a:lstStyle/>
           <a:p>
             <a:r>
-              <a:rPr lang="en-US" dirty="0" smtClean="0"/>
-              <a:t>action</a:t>
-            </a:r>
-            <a:endParaRPr lang="en-US" dirty="0"/>
-          </a:p>
-        </p:txBody>
-      </p:sp>
-      <p:sp>
-        <p:nvSpPr>
-          <p:cNvPr id="14" name="Right Arrow 13"/>
+              <a:rPr lang="en-US" sz="1400" dirty="0" smtClean="0"/>
+              <a:t>Actions container</a:t>
+            </a:r>
+          </a:p>
+        </p:txBody>
+      </p:sp>
+      <p:sp>
+        <p:nvSpPr>
+          <p:cNvPr id="12" name="Right Brace 11"/>
           <p:cNvSpPr/>
           <p:nvPr/>
         </p:nvSpPr>
         <p:spPr>
           <a:xfrm>
-            <a:off x="1253561" y="3667445"/>
-            <a:ext cx="940174" cy="339137"/>
+            <a:off x="5772988" y="2589791"/>
+            <a:ext cx="247413" cy="589203"/>
           </a:xfrm>
-          <a:prstGeom prst="rightArrow">
+          <a:prstGeom prst="rightBrace">
             <a:avLst/>
           </a:prstGeom>
-          <a:solidFill>
-            <a:srgbClr val="FFFFFF"/>
-          </a:solidFill>
-          <a:ln>
-            <a:solidFill>
-              <a:srgbClr val="000000"/>
-            </a:solidFill>
-          </a:ln>
-        </p:spPr>
-        <p:style>
-          <a:lnRef idx="1">
-            <a:schemeClr val="accent1"/>
-          </a:lnRef>
-          <a:fillRef idx="3">
-            <a:schemeClr val="accent1"/>
-          </a:fillRef>
-          <a:effectRef idx="2">
-            <a:schemeClr val="accent1"/>
-          </a:effectRef>
-          <a:fontRef idx="minor">
-            <a:schemeClr val="lt1"/>
-          </a:fontRef>
-        </p:style>
-        <p:txBody>
-          <a:bodyPr rtlCol="0" anchor="ctr"/>
-          <a:lstStyle/>
-          <a:p>
-            <a:pPr algn="ctr"/>
-            <a:r>
-              <a:rPr lang="en-US" dirty="0" smtClean="0">
-                <a:solidFill>
-                  <a:srgbClr val="000000"/>
-                </a:solidFill>
-              </a:rPr>
-              <a:t>import</a:t>
-            </a:r>
-            <a:endParaRPr lang="en-US" dirty="0">
-              <a:solidFill>
-                <a:srgbClr val="000000"/>
-              </a:solidFill>
-            </a:endParaRPr>
-          </a:p>
-        </p:txBody>
-      </p:sp>
-      <p:sp>
-        <p:nvSpPr>
-          <p:cNvPr id="27" name="Process 26"/>
-          <p:cNvSpPr/>
-          <p:nvPr/>
-        </p:nvSpPr>
-        <p:spPr>
-          <a:xfrm>
-            <a:off x="6074291" y="1916413"/>
-            <a:ext cx="2292242" cy="3563525"/>
-          </a:xfrm>
-          <a:prstGeom prst="flowChartProcess">
-            <a:avLst/>
-          </a:prstGeom>
-          <a:solidFill>
-            <a:srgbClr val="FFFFFF"/>
-          </a:solidFill>
-          <a:ln>
-            <a:solidFill>
-              <a:srgbClr val="000000"/>
-            </a:solidFill>
-          </a:ln>
-        </p:spPr>
-        <p:style>
-          <a:lnRef idx="1">
-            <a:schemeClr val="accent1"/>
-          </a:lnRef>
-          <a:fillRef idx="3">
-            <a:schemeClr val="accent1"/>
-          </a:fillRef>
-          <a:effectRef idx="2">
-            <a:schemeClr val="accent1"/>
-          </a:effectRef>
-          <a:fontRef idx="minor">
-            <a:schemeClr val="lt1"/>
-          </a:fontRef>
-        </p:style>
-        <p:txBody>
-          <a:bodyPr rtlCol="0" anchor="ctr"/>
-          <a:lstStyle/>
-          <a:p>
-            <a:endParaRPr lang="en-US" dirty="0"/>
-          </a:p>
-        </p:txBody>
-      </p:sp>
-      <p:sp>
-        <p:nvSpPr>
-          <p:cNvPr id="28" name="Document 27"/>
-          <p:cNvSpPr/>
-          <p:nvPr/>
-        </p:nvSpPr>
-        <p:spPr>
-          <a:xfrm>
-            <a:off x="5753833" y="1306074"/>
-            <a:ext cx="3222988" cy="5411026"/>
-          </a:xfrm>
-          <a:prstGeom prst="flowChartDocument">
-            <a:avLst/>
-          </a:prstGeom>
-          <a:noFill/>
           <a:ln>
             <a:solidFill>
               <a:schemeClr val="tx1"/>
@@ -4199,17 +4103,17 @@
           </a:ln>
         </p:spPr>
         <p:style>
-          <a:lnRef idx="1">
+          <a:lnRef idx="2">
             <a:schemeClr val="accent1"/>
           </a:lnRef>
-          <a:fillRef idx="3">
+          <a:fillRef idx="0">
             <a:schemeClr val="accent1"/>
           </a:fillRef>
-          <a:effectRef idx="2">
+          <a:effectRef idx="1">
             <a:schemeClr val="accent1"/>
           </a:effectRef>
           <a:fontRef idx="minor">
-            <a:schemeClr val="lt1"/>
+            <a:schemeClr val="tx1"/>
           </a:fontRef>
         </p:style>
         <p:txBody>
@@ -4223,500 +4127,94 @@
       </p:sp>
       <p:sp>
         <p:nvSpPr>
-          <p:cNvPr id="29" name="TextBox 28"/>
-          <p:cNvSpPr txBox="1"/>
+          <p:cNvPr id="13" name="Right Brace 12"/>
+          <p:cNvSpPr/>
           <p:nvPr/>
         </p:nvSpPr>
         <p:spPr>
           <a:xfrm>
-            <a:off x="5753832" y="1286563"/>
-            <a:ext cx="1491091" cy="369332"/>
+            <a:off x="5801681" y="3841753"/>
+            <a:ext cx="247413" cy="941939"/>
           </a:xfrm>
-          <a:prstGeom prst="rect">
+          <a:prstGeom prst="rightBrace">
             <a:avLst/>
           </a:prstGeom>
-          <a:noFill/>
-        </p:spPr>
-        <p:txBody>
-          <a:bodyPr wrap="square" rtlCol="0">
-            <a:spAutoFit/>
-          </a:bodyPr>
-          <a:lstStyle/>
-          <a:p>
-            <a:r>
-              <a:rPr lang="en-US" dirty="0" err="1" smtClean="0"/>
-              <a:t>newco-acl</a:t>
-            </a:r>
-            <a:endParaRPr lang="en-US" dirty="0"/>
-          </a:p>
-        </p:txBody>
-      </p:sp>
-      <p:sp>
-        <p:nvSpPr>
-          <p:cNvPr id="30" name="TextBox 29"/>
-          <p:cNvSpPr txBox="1"/>
-          <p:nvPr/>
-        </p:nvSpPr>
-        <p:spPr>
-          <a:xfrm>
-            <a:off x="6074291" y="1917325"/>
-            <a:ext cx="676264" cy="369332"/>
-          </a:xfrm>
-          <a:prstGeom prst="rect">
-            <a:avLst/>
-          </a:prstGeom>
-          <a:noFill/>
-        </p:spPr>
-        <p:txBody>
-          <a:bodyPr wrap="square" rtlCol="0">
-            <a:spAutoFit/>
-          </a:bodyPr>
-          <a:lstStyle/>
-          <a:p>
-            <a:r>
-              <a:rPr lang="en-US" dirty="0" err="1" smtClean="0"/>
-              <a:t>acl</a:t>
-            </a:r>
-            <a:endParaRPr lang="en-US" dirty="0"/>
-          </a:p>
-        </p:txBody>
-      </p:sp>
-      <p:sp>
-        <p:nvSpPr>
-          <p:cNvPr id="31" name="Process 30"/>
-          <p:cNvSpPr/>
-          <p:nvPr/>
-        </p:nvSpPr>
-        <p:spPr>
-          <a:xfrm>
-            <a:off x="6226691" y="3026433"/>
-            <a:ext cx="1941911" cy="2255559"/>
-          </a:xfrm>
-          <a:prstGeom prst="flowChartProcess">
-            <a:avLst/>
-          </a:prstGeom>
-          <a:solidFill>
-            <a:srgbClr val="FFFFFF"/>
-          </a:solidFill>
           <a:ln>
             <a:solidFill>
-              <a:srgbClr val="000000"/>
+              <a:schemeClr val="tx1"/>
             </a:solidFill>
           </a:ln>
         </p:spPr>
         <p:style>
-          <a:lnRef idx="1">
+          <a:lnRef idx="2">
             <a:schemeClr val="accent1"/>
           </a:lnRef>
-          <a:fillRef idx="3">
+          <a:fillRef idx="0">
             <a:schemeClr val="accent1"/>
           </a:fillRef>
-          <a:effectRef idx="2">
+          <a:effectRef idx="1">
             <a:schemeClr val="accent1"/>
           </a:effectRef>
           <a:fontRef idx="minor">
-            <a:schemeClr val="lt1"/>
+            <a:schemeClr val="tx1"/>
           </a:fontRef>
         </p:style>
         <p:txBody>
           <a:bodyPr rtlCol="0" anchor="ctr"/>
           <a:lstStyle/>
           <a:p>
-            <a:endParaRPr lang="en-US" dirty="0"/>
-          </a:p>
-        </p:txBody>
-      </p:sp>
-      <p:sp>
-        <p:nvSpPr>
-          <p:cNvPr id="32" name="TextBox 31"/>
-          <p:cNvSpPr txBox="1"/>
+            <a:pPr algn="ctr"/>
+            <a:endParaRPr lang="en-US"/>
+          </a:p>
+        </p:txBody>
+      </p:sp>
+      <p:sp>
+        <p:nvSpPr>
+          <p:cNvPr id="14" name="Right Brace 13"/>
+          <p:cNvSpPr/>
           <p:nvPr/>
         </p:nvSpPr>
         <p:spPr>
           <a:xfrm>
-            <a:off x="6227148" y="3026433"/>
-            <a:ext cx="676264" cy="369332"/>
+            <a:off x="5801681" y="5002074"/>
+            <a:ext cx="247413" cy="589203"/>
           </a:xfrm>
-          <a:prstGeom prst="rect">
+          <a:prstGeom prst="rightBrace">
             <a:avLst/>
           </a:prstGeom>
-          <a:noFill/>
-        </p:spPr>
-        <p:txBody>
-          <a:bodyPr wrap="square" rtlCol="0">
-            <a:spAutoFit/>
-          </a:bodyPr>
-          <a:lstStyle/>
-          <a:p>
-            <a:r>
-              <a:rPr lang="en-US" dirty="0" smtClean="0"/>
-              <a:t>ace</a:t>
-            </a:r>
-            <a:endParaRPr lang="en-US" dirty="0"/>
-          </a:p>
-        </p:txBody>
-      </p:sp>
-      <p:sp>
-        <p:nvSpPr>
-          <p:cNvPr id="33" name="Process 32"/>
-          <p:cNvSpPr/>
-          <p:nvPr/>
-        </p:nvSpPr>
-        <p:spPr>
-          <a:xfrm>
-            <a:off x="6226691" y="2286657"/>
-            <a:ext cx="1941911" cy="548291"/>
-          </a:xfrm>
-          <a:prstGeom prst="flowChartProcess">
-            <a:avLst/>
-          </a:prstGeom>
-          <a:solidFill>
-            <a:srgbClr val="FFFFFF"/>
-          </a:solidFill>
           <a:ln>
             <a:solidFill>
-              <a:srgbClr val="000000"/>
+              <a:schemeClr val="tx1"/>
             </a:solidFill>
           </a:ln>
         </p:spPr>
         <p:style>
-          <a:lnRef idx="1">
+          <a:lnRef idx="2">
             <a:schemeClr val="accent1"/>
           </a:lnRef>
-          <a:fillRef idx="3">
+          <a:fillRef idx="0">
             <a:schemeClr val="accent1"/>
           </a:fillRef>
-          <a:effectRef idx="2">
+          <a:effectRef idx="1">
             <a:schemeClr val="accent1"/>
           </a:effectRef>
           <a:fontRef idx="minor">
-            <a:schemeClr val="lt1"/>
+            <a:schemeClr val="tx1"/>
           </a:fontRef>
         </p:style>
         <p:txBody>
           <a:bodyPr rtlCol="0" anchor="ctr"/>
           <a:lstStyle/>
           <a:p>
-            <a:endParaRPr lang="en-US" dirty="0"/>
-          </a:p>
-        </p:txBody>
-      </p:sp>
-      <p:sp>
-        <p:nvSpPr>
-          <p:cNvPr id="34" name="TextBox 33"/>
-          <p:cNvSpPr txBox="1"/>
-          <p:nvPr/>
-        </p:nvSpPr>
-        <p:spPr>
-          <a:xfrm>
-            <a:off x="6227148" y="2307506"/>
-            <a:ext cx="1941453" cy="369332"/>
-          </a:xfrm>
-          <a:prstGeom prst="rect">
-            <a:avLst/>
-          </a:prstGeom>
-          <a:noFill/>
-        </p:spPr>
-        <p:txBody>
-          <a:bodyPr wrap="square" rtlCol="0">
-            <a:spAutoFit/>
-          </a:bodyPr>
-          <a:lstStyle/>
-          <a:p>
-            <a:r>
-              <a:rPr lang="en-US" dirty="0" err="1"/>
-              <a:t>a</a:t>
-            </a:r>
-            <a:r>
-              <a:rPr lang="en-US" dirty="0" err="1" smtClean="0"/>
-              <a:t>cl</a:t>
-            </a:r>
-            <a:r>
-              <a:rPr lang="en-US" dirty="0" smtClean="0"/>
-              <a:t>-</a:t>
-            </a:r>
-            <a:r>
-              <a:rPr lang="en-US" dirty="0" err="1" smtClean="0"/>
-              <a:t>oper</a:t>
-            </a:r>
-            <a:r>
-              <a:rPr lang="en-US" dirty="0" smtClean="0"/>
-              <a:t>-data</a:t>
-            </a:r>
-            <a:endParaRPr lang="en-US" dirty="0"/>
-          </a:p>
-        </p:txBody>
-      </p:sp>
-      <p:sp>
-        <p:nvSpPr>
-          <p:cNvPr id="35" name="Process 34"/>
-          <p:cNvSpPr/>
-          <p:nvPr/>
-        </p:nvSpPr>
-        <p:spPr>
-          <a:xfrm>
-            <a:off x="6354234" y="3504795"/>
-            <a:ext cx="1662423" cy="704990"/>
-          </a:xfrm>
-          <a:prstGeom prst="flowChartProcess">
-            <a:avLst/>
-          </a:prstGeom>
-          <a:solidFill>
-            <a:srgbClr val="FFFFFF"/>
-          </a:solidFill>
-          <a:ln>
-            <a:solidFill>
-              <a:srgbClr val="000000"/>
-            </a:solidFill>
-          </a:ln>
-        </p:spPr>
-        <p:style>
-          <a:lnRef idx="1">
-            <a:schemeClr val="accent1"/>
-          </a:lnRef>
-          <a:fillRef idx="3">
-            <a:schemeClr val="accent1"/>
-          </a:fillRef>
-          <a:effectRef idx="2">
-            <a:schemeClr val="accent1"/>
-          </a:effectRef>
-          <a:fontRef idx="minor">
-            <a:schemeClr val="lt1"/>
-          </a:fontRef>
-        </p:style>
-        <p:txBody>
-          <a:bodyPr rtlCol="0" anchor="ctr"/>
-          <a:lstStyle/>
-          <a:p>
-            <a:endParaRPr lang="en-US" dirty="0"/>
-          </a:p>
-        </p:txBody>
-      </p:sp>
-      <p:sp>
-        <p:nvSpPr>
-          <p:cNvPr id="36" name="Process 35"/>
-          <p:cNvSpPr/>
-          <p:nvPr/>
-        </p:nvSpPr>
-        <p:spPr>
-          <a:xfrm>
-            <a:off x="6354234" y="4333707"/>
-            <a:ext cx="1662423" cy="799826"/>
-          </a:xfrm>
-          <a:prstGeom prst="flowChartProcess">
-            <a:avLst/>
-          </a:prstGeom>
-          <a:solidFill>
-            <a:srgbClr val="FFFFFF"/>
-          </a:solidFill>
-          <a:ln>
-            <a:solidFill>
-              <a:srgbClr val="000000"/>
-            </a:solidFill>
-          </a:ln>
-        </p:spPr>
-        <p:style>
-          <a:lnRef idx="1">
-            <a:schemeClr val="accent1"/>
-          </a:lnRef>
-          <a:fillRef idx="3">
-            <a:schemeClr val="accent1"/>
-          </a:fillRef>
-          <a:effectRef idx="2">
-            <a:schemeClr val="accent1"/>
-          </a:effectRef>
-          <a:fontRef idx="minor">
-            <a:schemeClr val="lt1"/>
-          </a:fontRef>
-        </p:style>
-        <p:txBody>
-          <a:bodyPr rtlCol="0" anchor="ctr"/>
-          <a:lstStyle/>
-          <a:p>
-            <a:endParaRPr lang="en-US" dirty="0"/>
-          </a:p>
-        </p:txBody>
-      </p:sp>
-      <p:sp>
-        <p:nvSpPr>
-          <p:cNvPr id="37" name="TextBox 36"/>
-          <p:cNvSpPr txBox="1"/>
-          <p:nvPr/>
-        </p:nvSpPr>
-        <p:spPr>
-          <a:xfrm>
-            <a:off x="6379548" y="3513058"/>
-            <a:ext cx="865376" cy="369332"/>
-          </a:xfrm>
-          <a:prstGeom prst="rect">
-            <a:avLst/>
-          </a:prstGeom>
-          <a:noFill/>
-        </p:spPr>
-        <p:txBody>
-          <a:bodyPr wrap="square" rtlCol="0">
-            <a:spAutoFit/>
-          </a:bodyPr>
-          <a:lstStyle/>
-          <a:p>
-            <a:r>
-              <a:rPr lang="en-US" dirty="0" smtClean="0"/>
-              <a:t>match</a:t>
-            </a:r>
-            <a:endParaRPr lang="en-US" dirty="0"/>
-          </a:p>
-        </p:txBody>
-      </p:sp>
-      <p:sp>
-        <p:nvSpPr>
-          <p:cNvPr id="38" name="TextBox 37"/>
-          <p:cNvSpPr txBox="1"/>
-          <p:nvPr/>
-        </p:nvSpPr>
-        <p:spPr>
-          <a:xfrm>
-            <a:off x="6392089" y="4333707"/>
-            <a:ext cx="1001284" cy="369332"/>
-          </a:xfrm>
-          <a:prstGeom prst="rect">
-            <a:avLst/>
-          </a:prstGeom>
-          <a:noFill/>
-        </p:spPr>
-        <p:txBody>
-          <a:bodyPr wrap="square" rtlCol="0">
-            <a:spAutoFit/>
-          </a:bodyPr>
-          <a:lstStyle/>
-          <a:p>
-            <a:r>
-              <a:rPr lang="en-US" dirty="0" smtClean="0"/>
-              <a:t>action</a:t>
-            </a:r>
-            <a:endParaRPr lang="en-US" dirty="0"/>
-          </a:p>
-        </p:txBody>
-      </p:sp>
-      <p:sp>
-        <p:nvSpPr>
-          <p:cNvPr id="15" name="Right Arrow 14"/>
-          <p:cNvSpPr/>
-          <p:nvPr/>
-        </p:nvSpPr>
-        <p:spPr>
-          <a:xfrm>
-            <a:off x="3691212" y="3689646"/>
-            <a:ext cx="2700877" cy="500207"/>
-          </a:xfrm>
-          <a:prstGeom prst="rightArrow">
-            <a:avLst/>
-          </a:prstGeom>
-          <a:solidFill>
-            <a:srgbClr val="FFFFFF"/>
-          </a:solidFill>
-          <a:ln>
-            <a:solidFill>
-              <a:srgbClr val="000000"/>
-            </a:solidFill>
-          </a:ln>
-        </p:spPr>
-        <p:style>
-          <a:lnRef idx="1">
-            <a:schemeClr val="accent1"/>
-          </a:lnRef>
-          <a:fillRef idx="3">
-            <a:schemeClr val="accent1"/>
-          </a:fillRef>
-          <a:effectRef idx="2">
-            <a:schemeClr val="accent1"/>
-          </a:effectRef>
-          <a:fontRef idx="minor">
-            <a:schemeClr val="lt1"/>
-          </a:fontRef>
-        </p:style>
-        <p:txBody>
-          <a:bodyPr rtlCol="0" anchor="ctr"/>
-          <a:lstStyle/>
-          <a:p>
             <a:pPr algn="ctr"/>
-            <a:r>
-              <a:rPr lang="en-US" dirty="0" smtClean="0">
-                <a:solidFill>
-                  <a:schemeClr val="tx1"/>
-                </a:solidFill>
-              </a:rPr>
-              <a:t>augmentation</a:t>
-            </a:r>
-            <a:endParaRPr lang="en-US" dirty="0">
-              <a:solidFill>
-                <a:schemeClr val="tx1"/>
-              </a:solidFill>
-            </a:endParaRPr>
-          </a:p>
-        </p:txBody>
-      </p:sp>
-      <p:sp>
-        <p:nvSpPr>
-          <p:cNvPr id="39" name="Right Arrow 38"/>
-          <p:cNvSpPr/>
-          <p:nvPr/>
-        </p:nvSpPr>
-        <p:spPr>
-          <a:xfrm>
-            <a:off x="3691212" y="4518372"/>
-            <a:ext cx="2700877" cy="595229"/>
-          </a:xfrm>
-          <a:prstGeom prst="rightArrow">
-            <a:avLst/>
-          </a:prstGeom>
-          <a:solidFill>
-            <a:srgbClr val="FFFFFF"/>
-          </a:solidFill>
-          <a:ln>
-            <a:solidFill>
-              <a:srgbClr val="000000"/>
-            </a:solidFill>
-          </a:ln>
-        </p:spPr>
-        <p:style>
-          <a:lnRef idx="1">
-            <a:schemeClr val="accent1"/>
-          </a:lnRef>
-          <a:fillRef idx="3">
-            <a:schemeClr val="accent1"/>
-          </a:fillRef>
-          <a:effectRef idx="2">
-            <a:schemeClr val="accent1"/>
-          </a:effectRef>
-          <a:fontRef idx="minor">
-            <a:schemeClr val="lt1"/>
-          </a:fontRef>
-        </p:style>
-        <p:txBody>
-          <a:bodyPr rtlCol="0" anchor="ctr"/>
-          <a:lstStyle/>
-          <a:p>
-            <a:pPr algn="ctr"/>
-            <a:r>
-              <a:rPr lang="en-US" dirty="0" smtClean="0">
-                <a:solidFill>
-                  <a:schemeClr val="tx1"/>
-                </a:solidFill>
-              </a:rPr>
-              <a:t>augmentation</a:t>
-            </a:r>
-            <a:endParaRPr lang="en-US" dirty="0">
-              <a:solidFill>
-                <a:schemeClr val="tx1"/>
-              </a:solidFill>
-            </a:endParaRPr>
+            <a:endParaRPr lang="en-US"/>
           </a:p>
         </p:txBody>
       </p:sp>
     </p:spTree>
     <p:extLst>
       <p:ext uri="{BB962C8B-B14F-4D97-AF65-F5344CB8AC3E}">
-        <p14:creationId xmlns:p14="http://schemas.microsoft.com/office/powerpoint/2010/main" val="869887092"/>
+        <p14:creationId xmlns:p14="http://schemas.microsoft.com/office/powerpoint/2010/main" val="3903245709"/>
       </p:ext>
     </p:extLst>
   </p:cSld>

</xml_diff>

<commit_message>
few edits per Kiran email
</commit_message>
<xml_diff>
--- a/experimental/ietf/ietf90 acl draft.pptx
+++ b/experimental/ietf/ietf90 acl draft.pptx
@@ -6,10 +6,11 @@
   </p:sldMasterIdLst>
   <p:sldIdLst>
     <p:sldId id="256" r:id="rId2"/>
-    <p:sldId id="257" r:id="rId3"/>
-    <p:sldId id="259" r:id="rId4"/>
-    <p:sldId id="261" r:id="rId5"/>
-    <p:sldId id="260" r:id="rId6"/>
+    <p:sldId id="262" r:id="rId3"/>
+    <p:sldId id="257" r:id="rId4"/>
+    <p:sldId id="259" r:id="rId5"/>
+    <p:sldId id="261" r:id="rId6"/>
+    <p:sldId id="260" r:id="rId7"/>
   </p:sldIdLst>
   <p:sldSz cx="9144000" cy="6858000" type="screen4x3"/>
   <p:notesSz cx="6858000" cy="9144000"/>
@@ -292,7 +293,7 @@
           <a:p>
             <a:fld id="{4869DD78-ACC6-B744-9FFC-0F30EF067F1A}" type="datetimeFigureOut">
               <a:rPr lang="en-US" smtClean="0"/>
-              <a:t>7/10/14</a:t>
+              <a:t>7/14/14</a:t>
             </a:fld>
             <a:endParaRPr lang="en-US"/>
           </a:p>
@@ -462,7 +463,7 @@
           <a:p>
             <a:fld id="{4869DD78-ACC6-B744-9FFC-0F30EF067F1A}" type="datetimeFigureOut">
               <a:rPr lang="en-US" smtClean="0"/>
-              <a:t>7/10/14</a:t>
+              <a:t>7/14/14</a:t>
             </a:fld>
             <a:endParaRPr lang="en-US"/>
           </a:p>
@@ -642,7 +643,7 @@
           <a:p>
             <a:fld id="{4869DD78-ACC6-B744-9FFC-0F30EF067F1A}" type="datetimeFigureOut">
               <a:rPr lang="en-US" smtClean="0"/>
-              <a:t>7/10/14</a:t>
+              <a:t>7/14/14</a:t>
             </a:fld>
             <a:endParaRPr lang="en-US"/>
           </a:p>
@@ -812,7 +813,7 @@
           <a:p>
             <a:fld id="{4869DD78-ACC6-B744-9FFC-0F30EF067F1A}" type="datetimeFigureOut">
               <a:rPr lang="en-US" smtClean="0"/>
-              <a:t>7/10/14</a:t>
+              <a:t>7/14/14</a:t>
             </a:fld>
             <a:endParaRPr lang="en-US"/>
           </a:p>
@@ -1058,7 +1059,7 @@
           <a:p>
             <a:fld id="{4869DD78-ACC6-B744-9FFC-0F30EF067F1A}" type="datetimeFigureOut">
               <a:rPr lang="en-US" smtClean="0"/>
-              <a:t>7/10/14</a:t>
+              <a:t>7/14/14</a:t>
             </a:fld>
             <a:endParaRPr lang="en-US"/>
           </a:p>
@@ -1346,7 +1347,7 @@
           <a:p>
             <a:fld id="{4869DD78-ACC6-B744-9FFC-0F30EF067F1A}" type="datetimeFigureOut">
               <a:rPr lang="en-US" smtClean="0"/>
-              <a:t>7/10/14</a:t>
+              <a:t>7/14/14</a:t>
             </a:fld>
             <a:endParaRPr lang="en-US"/>
           </a:p>
@@ -1768,7 +1769,7 @@
           <a:p>
             <a:fld id="{4869DD78-ACC6-B744-9FFC-0F30EF067F1A}" type="datetimeFigureOut">
               <a:rPr lang="en-US" smtClean="0"/>
-              <a:t>7/10/14</a:t>
+              <a:t>7/14/14</a:t>
             </a:fld>
             <a:endParaRPr lang="en-US"/>
           </a:p>
@@ -1886,7 +1887,7 @@
           <a:p>
             <a:fld id="{4869DD78-ACC6-B744-9FFC-0F30EF067F1A}" type="datetimeFigureOut">
               <a:rPr lang="en-US" smtClean="0"/>
-              <a:t>7/10/14</a:t>
+              <a:t>7/14/14</a:t>
             </a:fld>
             <a:endParaRPr lang="en-US"/>
           </a:p>
@@ -1981,7 +1982,7 @@
           <a:p>
             <a:fld id="{4869DD78-ACC6-B744-9FFC-0F30EF067F1A}" type="datetimeFigureOut">
               <a:rPr lang="en-US" smtClean="0"/>
-              <a:t>7/10/14</a:t>
+              <a:t>7/14/14</a:t>
             </a:fld>
             <a:endParaRPr lang="en-US"/>
           </a:p>
@@ -2258,7 +2259,7 @@
           <a:p>
             <a:fld id="{4869DD78-ACC6-B744-9FFC-0F30EF067F1A}" type="datetimeFigureOut">
               <a:rPr lang="en-US" smtClean="0"/>
-              <a:t>7/10/14</a:t>
+              <a:t>7/14/14</a:t>
             </a:fld>
             <a:endParaRPr lang="en-US"/>
           </a:p>
@@ -2511,7 +2512,7 @@
           <a:p>
             <a:fld id="{4869DD78-ACC6-B744-9FFC-0F30EF067F1A}" type="datetimeFigureOut">
               <a:rPr lang="en-US" smtClean="0"/>
-              <a:t>7/10/14</a:t>
+              <a:t>7/14/14</a:t>
             </a:fld>
             <a:endParaRPr lang="en-US"/>
           </a:p>
@@ -2724,7 +2725,7 @@
           <a:p>
             <a:fld id="{4869DD78-ACC6-B744-9FFC-0F30EF067F1A}" type="datetimeFigureOut">
               <a:rPr lang="en-US" smtClean="0"/>
-              <a:t>7/10/14</a:t>
+              <a:t>7/14/14</a:t>
             </a:fld>
             <a:endParaRPr lang="en-US"/>
           </a:p>
@@ -3130,7 +3131,18 @@
             </a:br>
             <a:r>
               <a:rPr lang="en-US" dirty="0" smtClean="0"/>
-              <a:t>draft-bogdanovic-netmod-acl-model-01</a:t>
+              <a:t>draft-bogdanovic-netmod-acl-model-</a:t>
+            </a:r>
+            <a:r>
+              <a:rPr lang="en-US" dirty="0" smtClean="0"/>
+              <a:t>01</a:t>
+            </a:r>
+            <a:br>
+              <a:rPr lang="en-US" dirty="0" smtClean="0"/>
+            </a:br>
+            <a:r>
+              <a:rPr lang="en-US" dirty="0" smtClean="0"/>
+              <a:t>IETF 90 Toronto</a:t>
             </a:r>
             <a:endParaRPr lang="en-US" dirty="0"/>
           </a:p>
@@ -3233,7 +3245,7 @@
           <a:p>
             <a:r>
               <a:rPr lang="en-US" dirty="0" smtClean="0"/>
-              <a:t>Motivation</a:t>
+              <a:t>Agenda</a:t>
             </a:r>
             <a:endParaRPr lang="en-US" dirty="0"/>
           </a:p>
@@ -3256,46 +3268,20 @@
           <a:p>
             <a:r>
               <a:rPr lang="en-US" dirty="0" smtClean="0"/>
-              <a:t>Previous draft draft-</a:t>
-            </a:r>
-            <a:r>
-              <a:rPr lang="en-US" dirty="0" err="1" smtClean="0"/>
-              <a:t>huang</a:t>
-            </a:r>
-            <a:r>
-              <a:rPr lang="en-US" dirty="0" smtClean="0"/>
-              <a:t>-</a:t>
-            </a:r>
-            <a:r>
-              <a:rPr lang="en-US" dirty="0" err="1" smtClean="0"/>
-              <a:t>netmod-acl</a:t>
-            </a:r>
-            <a:r>
-              <a:rPr lang="en-US" dirty="0" smtClean="0"/>
-              <a:t> was complicated and the ACL structure is not obvious</a:t>
-            </a:r>
-          </a:p>
-          <a:p>
-            <a:r>
-              <a:rPr lang="en-US" dirty="0" smtClean="0"/>
-              <a:t>Create common base model that can be extended:</a:t>
-            </a:r>
-          </a:p>
-          <a:p>
-            <a:pPr lvl="1"/>
-            <a:r>
-              <a:rPr lang="en-US" dirty="0" smtClean="0"/>
-              <a:t>packet headers</a:t>
-            </a:r>
-          </a:p>
-          <a:p>
-            <a:pPr lvl="1"/>
-            <a:r>
-              <a:rPr lang="en-US" dirty="0" smtClean="0"/>
-              <a:t>vendor specific</a:t>
-            </a:r>
-          </a:p>
-          <a:p>
+              <a:t>Motivation for new draft</a:t>
+            </a:r>
+          </a:p>
+          <a:p>
+            <a:r>
+              <a:rPr lang="en-US" dirty="0" smtClean="0"/>
+              <a:t>Design</a:t>
+            </a:r>
+          </a:p>
+          <a:p>
+            <a:r>
+              <a:rPr lang="en-US" dirty="0" smtClean="0"/>
+              <a:t>Next steps</a:t>
+            </a:r>
             <a:endParaRPr lang="en-US" dirty="0"/>
           </a:p>
         </p:txBody>
@@ -3303,7 +3289,7 @@
     </p:spTree>
     <p:extLst>
       <p:ext uri="{BB962C8B-B14F-4D97-AF65-F5344CB8AC3E}">
-        <p14:creationId xmlns:p14="http://schemas.microsoft.com/office/powerpoint/2010/main" val="950627136"/>
+        <p14:creationId xmlns:p14="http://schemas.microsoft.com/office/powerpoint/2010/main" val="3535826479"/>
       </p:ext>
     </p:extLst>
   </p:cSld>
@@ -3347,6 +3333,120 @@
           <a:p>
             <a:r>
               <a:rPr lang="en-US" dirty="0" smtClean="0"/>
+              <a:t>Motivation</a:t>
+            </a:r>
+            <a:endParaRPr lang="en-US" dirty="0"/>
+          </a:p>
+        </p:txBody>
+      </p:sp>
+      <p:sp>
+        <p:nvSpPr>
+          <p:cNvPr id="3" name="Content Placeholder 2"/>
+          <p:cNvSpPr>
+            <a:spLocks noGrp="1"/>
+          </p:cNvSpPr>
+          <p:nvPr>
+            <p:ph idx="1"/>
+          </p:nvPr>
+        </p:nvSpPr>
+        <p:spPr/>
+        <p:txBody>
+          <a:bodyPr/>
+          <a:lstStyle/>
+          <a:p>
+            <a:r>
+              <a:rPr lang="en-US" dirty="0" smtClean="0"/>
+              <a:t>Previous draft draft-</a:t>
+            </a:r>
+            <a:r>
+              <a:rPr lang="en-US" dirty="0" err="1" smtClean="0"/>
+              <a:t>huang</a:t>
+            </a:r>
+            <a:r>
+              <a:rPr lang="en-US" dirty="0" smtClean="0"/>
+              <a:t>-</a:t>
+            </a:r>
+            <a:r>
+              <a:rPr lang="en-US" dirty="0" err="1" smtClean="0"/>
+              <a:t>netmod-acl</a:t>
+            </a:r>
+            <a:r>
+              <a:rPr lang="en-US" dirty="0" smtClean="0"/>
+              <a:t> was complicated and the ACL structure is not obvious</a:t>
+            </a:r>
+          </a:p>
+          <a:p>
+            <a:r>
+              <a:rPr lang="en-US" dirty="0" smtClean="0"/>
+              <a:t>Create common base model that can be extended:</a:t>
+            </a:r>
+          </a:p>
+          <a:p>
+            <a:pPr lvl="1"/>
+            <a:r>
+              <a:rPr lang="en-US" dirty="0" smtClean="0"/>
+              <a:t>packet headers</a:t>
+            </a:r>
+          </a:p>
+          <a:p>
+            <a:pPr lvl="1"/>
+            <a:r>
+              <a:rPr lang="en-US" dirty="0" smtClean="0"/>
+              <a:t>vendor specific</a:t>
+            </a:r>
+          </a:p>
+          <a:p>
+            <a:endParaRPr lang="en-US" dirty="0"/>
+          </a:p>
+        </p:txBody>
+      </p:sp>
+    </p:spTree>
+    <p:extLst>
+      <p:ext uri="{BB962C8B-B14F-4D97-AF65-F5344CB8AC3E}">
+        <p14:creationId xmlns:p14="http://schemas.microsoft.com/office/powerpoint/2010/main" val="950627136"/>
+      </p:ext>
+    </p:extLst>
+  </p:cSld>
+  <p:clrMapOvr>
+    <a:masterClrMapping/>
+  </p:clrMapOvr>
+</p:sld>
+</file>
+
+<file path=ppt/slides/slide4.xml><?xml version="1.0" encoding="utf-8"?>
+<p:sld xmlns:a="http://schemas.openxmlformats.org/drawingml/2006/main" xmlns:r="http://schemas.openxmlformats.org/officeDocument/2006/relationships" xmlns:p="http://schemas.openxmlformats.org/presentationml/2006/main">
+  <p:cSld>
+    <p:spTree>
+      <p:nvGrpSpPr>
+        <p:cNvPr id="1" name=""/>
+        <p:cNvGrpSpPr/>
+        <p:nvPr/>
+      </p:nvGrpSpPr>
+      <p:grpSpPr>
+        <a:xfrm>
+          <a:off x="0" y="0"/>
+          <a:ext cx="0" cy="0"/>
+          <a:chOff x="0" y="0"/>
+          <a:chExt cx="0" cy="0"/>
+        </a:xfrm>
+      </p:grpSpPr>
+      <p:sp>
+        <p:nvSpPr>
+          <p:cNvPr id="2" name="Title 1"/>
+          <p:cNvSpPr>
+            <a:spLocks noGrp="1"/>
+          </p:cNvSpPr>
+          <p:nvPr>
+            <p:ph type="title"/>
+          </p:nvPr>
+        </p:nvSpPr>
+        <p:spPr/>
+        <p:txBody>
+          <a:bodyPr/>
+          <a:lstStyle/>
+          <a:p>
+            <a:r>
+              <a:rPr lang="en-US" dirty="0" smtClean="0"/>
               <a:t>Design</a:t>
             </a:r>
             <a:endParaRPr lang="en-US" dirty="0"/>
@@ -3496,7 +3596,7 @@
 </p:sld>
 </file>
 
-<file path=ppt/slides/slide4.xml><?xml version="1.0" encoding="utf-8"?>
+<file path=ppt/slides/slide5.xml><?xml version="1.0" encoding="utf-8"?>
 <p:sld xmlns:a="http://schemas.openxmlformats.org/drawingml/2006/main" xmlns:r="http://schemas.openxmlformats.org/officeDocument/2006/relationships" xmlns:p="http://schemas.openxmlformats.org/presentationml/2006/main">
   <p:cSld>
     <p:spTree>
@@ -4224,7 +4324,7 @@
 </p:sld>
 </file>
 
-<file path=ppt/slides/slide5.xml><?xml version="1.0" encoding="utf-8"?>
+<file path=ppt/slides/slide6.xml><?xml version="1.0" encoding="utf-8"?>
 <p:sld xmlns:a="http://schemas.openxmlformats.org/drawingml/2006/main" xmlns:r="http://schemas.openxmlformats.org/officeDocument/2006/relationships" xmlns:p="http://schemas.openxmlformats.org/presentationml/2006/main">
   <p:cSld>
     <p:spTree>

</xml_diff>